<commit_message>
Seitenzahlen und PDF erstellt
</commit_message>
<xml_diff>
--- a/Johannsen_Gollek_Kock_Fuchs_GWV_Tutorial_11.pptx
+++ b/Johannsen_Gollek_Kock_Fuchs_GWV_Tutorial_11.pptx
@@ -5027,7 +5027,12 @@
     <dgm:cxn modelId="{6BEBF720-54C6-40AD-8CEA-2D6BFD78043D}" srcId="{7E736765-FA10-46BC-A767-9DA403286DF9}" destId="{6C567E9F-F766-4B71-BED2-D70FE866A48B}" srcOrd="2" destOrd="0" parTransId="{E257AF35-0512-4A62-9B3D-05A8BB0C6495}" sibTransId="{598D925E-8E99-418C-9CD9-C7CFB0B88CBF}"/>
     <dgm:cxn modelId="{00B5F024-5ADF-4655-ACB2-EC0024FF16FA}" type="presOf" srcId="{EFCC339F-2AA0-4EA1-BD34-282A9CFAF2A5}" destId="{62ADE23E-E780-41C3-8AF2-B183703671A8}" srcOrd="0" destOrd="0" presId="urn:microsoft.com/office/officeart/2005/8/layout/hierarchy2"/>
     <dgm:cxn modelId="{1E38E72F-EB80-4CCF-8D00-179C72E2799F}" type="presOf" srcId="{937BEE1A-E55F-4819-B63D-31BB52A0C6AD}" destId="{8BBB6B20-E0A9-4B6F-A56D-39A6D86EF1F3}" srcOrd="0" destOrd="0" presId="urn:microsoft.com/office/officeart/2005/8/layout/hierarchy2"/>
+    <dgm:cxn modelId="{21141E5C-0231-406A-914D-6C84C1C8072C}" type="presOf" srcId="{F22796A5-40F4-4C64-993A-EDF7523DCBA1}" destId="{4F44E618-948F-4593-A7EF-135BA6ED2BBB}" srcOrd="1" destOrd="0" presId="urn:microsoft.com/office/officeart/2005/8/layout/hierarchy2"/>
+    <dgm:cxn modelId="{DFB6CB5C-998E-4912-9E14-AFB5F6E0634E}" type="presOf" srcId="{366D491C-9ED9-49A8-BD06-7A5395A640DD}" destId="{957B3DD7-EB27-4E8F-BAB9-FA3FDA8AD7F7}" srcOrd="0" destOrd="0" presId="urn:microsoft.com/office/officeart/2005/8/layout/hierarchy2"/>
+    <dgm:cxn modelId="{83363A5D-5CE0-4B22-BB09-DB04BEC1FC51}" type="presOf" srcId="{BF857D99-37A7-46A3-A478-186AF92D81C9}" destId="{50E13B76-7B12-4938-A72C-E3E6D388BB01}" srcOrd="1" destOrd="0" presId="urn:microsoft.com/office/officeart/2005/8/layout/hierarchy2"/>
     <dgm:cxn modelId="{CEE0B442-6CA1-49D7-A036-7D40091EAC51}" type="presOf" srcId="{C1138BEA-52E6-4B7F-9902-330FB4C968AF}" destId="{39EB5202-1766-4871-9A9D-EACA79299C8B}" srcOrd="1" destOrd="0" presId="urn:microsoft.com/office/officeart/2005/8/layout/hierarchy2"/>
+    <dgm:cxn modelId="{9DE9796B-A767-4177-A07F-4C646837DD2C}" type="presOf" srcId="{E257AF35-0512-4A62-9B3D-05A8BB0C6495}" destId="{BE361C11-67A4-4ADB-87CE-ACAA77F12B1D}" srcOrd="1" destOrd="0" presId="urn:microsoft.com/office/officeart/2005/8/layout/hierarchy2"/>
+    <dgm:cxn modelId="{978A1570-27C7-4A18-8A3D-FE4C276D6439}" type="presOf" srcId="{6761A08C-EA31-4373-A2DA-2F8491B9D1FF}" destId="{EC1E7AF9-8B92-486C-A415-63B9BFE41CDA}" srcOrd="0" destOrd="0" presId="urn:microsoft.com/office/officeart/2005/8/layout/hierarchy2"/>
     <dgm:cxn modelId="{D5B84150-C631-470B-86E0-9B7EFCB89FA7}" srcId="{366D491C-9ED9-49A8-BD06-7A5395A640DD}" destId="{B5D36CCE-7F73-4857-87C9-D570DDA64D27}" srcOrd="2" destOrd="0" parTransId="{C9FD2A48-7DAF-48F5-AAC8-33CDF9DB0136}" sibTransId="{E6EE0FB4-B647-4A89-A8E0-42F7C5A7EED5}"/>
     <dgm:cxn modelId="{33E76D50-D79A-4B6B-BAFB-2D4798081F10}" type="presOf" srcId="{F26B6673-5D5C-42EF-A20F-35DF063CF4EA}" destId="{6067B03A-2637-48D6-B72B-7DD6849E7D29}" srcOrd="1" destOrd="0" presId="urn:microsoft.com/office/officeart/2005/8/layout/hierarchy2"/>
     <dgm:cxn modelId="{010A8C50-F321-43AB-8300-EE4C3D23D63A}" type="presOf" srcId="{3E19D288-45D0-42A1-A530-E0932829F07D}" destId="{261F2EE2-D172-4BD6-B566-822DE2168180}" srcOrd="0" destOrd="0" presId="urn:microsoft.com/office/officeart/2005/8/layout/hierarchy2"/>
@@ -5036,16 +5041,11 @@
     <dgm:cxn modelId="{743DD452-BC98-4D94-8A17-ECA681B000D6}" type="presOf" srcId="{BF857D99-37A7-46A3-A478-186AF92D81C9}" destId="{2196DF98-4DC3-4C8A-A40B-321D89D55400}" srcOrd="0" destOrd="0" presId="urn:microsoft.com/office/officeart/2005/8/layout/hierarchy2"/>
     <dgm:cxn modelId="{B0395355-2F4B-4296-A648-01CCF5CA554E}" type="presOf" srcId="{8E3D5E3F-DBD6-492E-B605-1456247F5EBE}" destId="{E3D133DB-C021-40B0-97C1-15E910DF3267}" srcOrd="0" destOrd="0" presId="urn:microsoft.com/office/officeart/2005/8/layout/hierarchy2"/>
     <dgm:cxn modelId="{A0003856-3C50-4044-8A68-162A5283D15C}" type="presOf" srcId="{540375EB-1E7A-4B8F-B800-2CE2D659C31D}" destId="{6FAE95C6-40F8-40D9-AAB3-80A201B4DC2B}" srcOrd="0" destOrd="0" presId="urn:microsoft.com/office/officeart/2005/8/layout/hierarchy2"/>
-    <dgm:cxn modelId="{4C840F59-2651-4076-9E13-FEFC2EF75CD0}" type="presOf" srcId="{6A40CE51-CA2C-4718-9A3A-3C9A2279E605}" destId="{4C44898E-20E6-4E66-BDEA-9C8D6F2635BD}" srcOrd="0" destOrd="0" presId="urn:microsoft.com/office/officeart/2005/8/layout/hierarchy2"/>
-    <dgm:cxn modelId="{8A4DD859-E6E0-48FB-BBD2-57DEB9B25C46}" type="presOf" srcId="{534D7F7A-6860-40D7-88E2-495833B2B310}" destId="{04BD8892-FF00-49FC-AFAB-E1B26B045A29}" srcOrd="0" destOrd="0" presId="urn:microsoft.com/office/officeart/2005/8/layout/hierarchy2"/>
-    <dgm:cxn modelId="{21141E5C-0231-406A-914D-6C84C1C8072C}" type="presOf" srcId="{F22796A5-40F4-4C64-993A-EDF7523DCBA1}" destId="{4F44E618-948F-4593-A7EF-135BA6ED2BBB}" srcOrd="1" destOrd="0" presId="urn:microsoft.com/office/officeart/2005/8/layout/hierarchy2"/>
-    <dgm:cxn modelId="{DFB6CB5C-998E-4912-9E14-AFB5F6E0634E}" type="presOf" srcId="{366D491C-9ED9-49A8-BD06-7A5395A640DD}" destId="{957B3DD7-EB27-4E8F-BAB9-FA3FDA8AD7F7}" srcOrd="0" destOrd="0" presId="urn:microsoft.com/office/officeart/2005/8/layout/hierarchy2"/>
-    <dgm:cxn modelId="{83363A5D-5CE0-4B22-BB09-DB04BEC1FC51}" type="presOf" srcId="{BF857D99-37A7-46A3-A478-186AF92D81C9}" destId="{50E13B76-7B12-4938-A72C-E3E6D388BB01}" srcOrd="1" destOrd="0" presId="urn:microsoft.com/office/officeart/2005/8/layout/hierarchy2"/>
-    <dgm:cxn modelId="{9DE9796B-A767-4177-A07F-4C646837DD2C}" type="presOf" srcId="{E257AF35-0512-4A62-9B3D-05A8BB0C6495}" destId="{BE361C11-67A4-4ADB-87CE-ACAA77F12B1D}" srcOrd="1" destOrd="0" presId="urn:microsoft.com/office/officeart/2005/8/layout/hierarchy2"/>
-    <dgm:cxn modelId="{978A1570-27C7-4A18-8A3D-FE4C276D6439}" type="presOf" srcId="{6761A08C-EA31-4373-A2DA-2F8491B9D1FF}" destId="{EC1E7AF9-8B92-486C-A415-63B9BFE41CDA}" srcOrd="0" destOrd="0" presId="urn:microsoft.com/office/officeart/2005/8/layout/hierarchy2"/>
     <dgm:cxn modelId="{FEE17976-AD9B-4D2F-8426-768F1E678D71}" type="presOf" srcId="{56220A94-95E6-479C-AC1E-346415A7C8F5}" destId="{28BBB6E2-0FCB-478B-AC3C-01E6200B7D50}" srcOrd="0" destOrd="0" presId="urn:microsoft.com/office/officeart/2005/8/layout/hierarchy2"/>
     <dgm:cxn modelId="{C1D5B577-8048-4F6B-BD52-315BCF61D314}" type="presOf" srcId="{5B2CA671-5AB0-4E07-8F2F-5B0456D6FD9E}" destId="{9CF5C9BF-14F5-48B5-B1B9-AC7DAC1B15C0}" srcOrd="0" destOrd="0" presId="urn:microsoft.com/office/officeart/2005/8/layout/hierarchy2"/>
+    <dgm:cxn modelId="{4C840F59-2651-4076-9E13-FEFC2EF75CD0}" type="presOf" srcId="{6A40CE51-CA2C-4718-9A3A-3C9A2279E605}" destId="{4C44898E-20E6-4E66-BDEA-9C8D6F2635BD}" srcOrd="0" destOrd="0" presId="urn:microsoft.com/office/officeart/2005/8/layout/hierarchy2"/>
     <dgm:cxn modelId="{286E2F79-FE37-45B0-A702-426557774669}" type="presOf" srcId="{E1F34782-E0A0-409C-A2D9-7583534B518A}" destId="{0CBB6B77-381B-4469-852E-85F6AF919D00}" srcOrd="1" destOrd="0" presId="urn:microsoft.com/office/officeart/2005/8/layout/hierarchy2"/>
+    <dgm:cxn modelId="{8A4DD859-E6E0-48FB-BBD2-57DEB9B25C46}" type="presOf" srcId="{534D7F7A-6860-40D7-88E2-495833B2B310}" destId="{04BD8892-FF00-49FC-AFAB-E1B26B045A29}" srcOrd="0" destOrd="0" presId="urn:microsoft.com/office/officeart/2005/8/layout/hierarchy2"/>
     <dgm:cxn modelId="{A873F27D-C327-4BCE-9BD6-0CE603A9747B}" type="presOf" srcId="{3E19D288-45D0-42A1-A530-E0932829F07D}" destId="{845E3D3A-7F0B-4C8D-B32C-3FB19BD2F928}" srcOrd="1" destOrd="0" presId="urn:microsoft.com/office/officeart/2005/8/layout/hierarchy2"/>
     <dgm:cxn modelId="{9326E280-1776-43C5-8C8B-630213E0BD84}" type="presOf" srcId="{08695B70-B818-4F63-B1EF-BA819DC219D0}" destId="{A95D9854-B85F-42AB-8630-B32E1C554CF8}" srcOrd="0" destOrd="0" presId="urn:microsoft.com/office/officeart/2005/8/layout/hierarchy2"/>
     <dgm:cxn modelId="{8A90F183-0CB6-4A93-BF5D-6BA21CD2161C}" type="presOf" srcId="{4C183E6A-4878-4CE9-88F0-571D197CC478}" destId="{8583799C-6957-4279-BFA6-3DFCBAD64319}" srcOrd="1" destOrd="0" presId="urn:microsoft.com/office/officeart/2005/8/layout/hierarchy2"/>
@@ -11734,7 +11734,7 @@
             <a:pPr rtl="0"/>
             <a:fld id="{596F7AAD-4E32-493B-9143-7857541B1B7A}" type="datetime1">
               <a:rPr lang="de-DE" smtClean="0"/>
-              <a:t>22.01.19</a:t>
+              <a:t>22.01.2019</a:t>
             </a:fld>
             <a:endParaRPr lang="de-DE" dirty="0"/>
           </a:p>
@@ -11904,7 +11904,7 @@
             <a:pPr rtl="0"/>
             <a:fld id="{629381CA-3454-4486-8E1C-41DAA1DBA7A2}" type="datetime1">
               <a:rPr lang="de-DE" smtClean="0"/>
-              <a:t>22.01.19</a:t>
+              <a:t>22.01.2019</a:t>
             </a:fld>
             <a:endParaRPr lang="de-DE" dirty="0"/>
           </a:p>
@@ -12421,9 +12421,9 @@
           <a:bodyPr/>
           <a:lstStyle/>
           <a:p>
-            <a:fld id="{1160EA64-D806-43AC-9DF2-F8C432F32B4C}" type="datetimeFigureOut">
-              <a:rPr lang="en-US" dirty="0"/>
-              <a:t>1/22/19</a:t>
+            <a:fld id="{57D7E0A6-A9EA-4749-95E3-781A5B57A3AD}" type="datetime1">
+              <a:rPr lang="de-DE" smtClean="0"/>
+              <a:t>22.01.2019</a:t>
             </a:fld>
             <a:endParaRPr lang="en-US" dirty="0"/>
           </a:p>
@@ -12605,9 +12605,9 @@
           <a:lstStyle/>
           <a:p>
             <a:pPr rtl="0"/>
-            <a:fld id="{F853C35F-FBF4-4345-94FE-7C356BDC4E7C}" type="datetime1">
+            <a:fld id="{E3576799-3CB4-4705-BCE5-E8E09E8FF2D6}" type="datetime1">
               <a:rPr lang="de-DE" smtClean="0"/>
-              <a:t>22.01.19</a:t>
+              <a:t>22.01.2019</a:t>
             </a:fld>
             <a:endParaRPr lang="de-DE" dirty="0"/>
           </a:p>
@@ -12800,9 +12800,9 @@
           <a:lstStyle/>
           <a:p>
             <a:pPr rtl="0"/>
-            <a:fld id="{52CDA82A-C872-4250-A483-7FE20BF13E38}" type="datetime1">
+            <a:fld id="{AE20ED9B-434C-44AE-B608-9B116BF58B75}" type="datetime1">
               <a:rPr lang="de-DE" smtClean="0"/>
-              <a:t>22.01.19</a:t>
+              <a:t>22.01.2019</a:t>
             </a:fld>
             <a:endParaRPr lang="de-DE" dirty="0"/>
           </a:p>
@@ -12954,9 +12954,9 @@
           <a:lstStyle/>
           <a:p>
             <a:pPr rtl="0"/>
-            <a:fld id="{97F73663-BF2F-4471-9530-8437E90AE323}" type="datetime1">
+            <a:fld id="{931F7878-BF9D-4888-915A-51028E43405B}" type="datetime1">
               <a:rPr lang="de-DE" smtClean="0"/>
-              <a:t>22.01.19</a:t>
+              <a:t>22.01.2019</a:t>
             </a:fld>
             <a:endParaRPr lang="de-DE" dirty="0"/>
           </a:p>
@@ -13095,9 +13095,9 @@
           <a:lstStyle/>
           <a:p>
             <a:pPr rtl="0"/>
-            <a:fld id="{C9238AB1-56AF-4C2E-AF6E-8E2C93E1C7FC}" type="datetime1">
+            <a:fld id="{959B4C85-A362-49F5-93DF-A5D1D91E6FA9}" type="datetime1">
               <a:rPr lang="de-DE" smtClean="0"/>
-              <a:t>22.01.19</a:t>
+              <a:t>22.01.2019</a:t>
             </a:fld>
             <a:endParaRPr lang="de-DE" dirty="0"/>
           </a:p>
@@ -13378,9 +13378,9 @@
           <a:lstStyle/>
           <a:p>
             <a:pPr rtl="0"/>
-            <a:fld id="{F6217F63-A2E4-4C6D-9C5F-3A0056DF06E2}" type="datetime1">
+            <a:fld id="{01C7D575-F857-4295-9FC5-D87F40EF3908}" type="datetime1">
               <a:rPr lang="de-DE" smtClean="0"/>
-              <a:t>22.01.19</a:t>
+              <a:t>22.01.2019</a:t>
             </a:fld>
             <a:endParaRPr lang="de-DE" dirty="0"/>
           </a:p>
@@ -13441,7 +13441,6 @@
   <p:clrMapOvr>
     <a:overrideClrMapping bg1="dk1" tx1="lt1" bg2="dk2" tx2="lt2" accent1="accent1" accent2="accent2" accent3="accent3" accent4="accent4" accent5="accent5" accent6="accent6" hlink="hlink" folHlink="folHlink"/>
   </p:clrMapOvr>
-  <p:hf sldNum="0" hdr="0" ftr="0" dt="0"/>
 </p:sldLayout>
 </file>
 
@@ -13615,9 +13614,9 @@
           <a:lstStyle/>
           <a:p>
             <a:pPr rtl="0"/>
-            <a:fld id="{34415A36-1D33-4189-B6E1-470A4B0AE62D}" type="datetime1">
+            <a:fld id="{92F06684-466F-4ED9-9DB4-18E0D205072F}" type="datetime1">
               <a:rPr lang="de-DE" smtClean="0"/>
-              <a:t>22.01.19</a:t>
+              <a:t>22.01.2019</a:t>
             </a:fld>
             <a:endParaRPr lang="de-DE" dirty="0"/>
           </a:p>
@@ -13989,9 +13988,9 @@
           <a:lstStyle/>
           <a:p>
             <a:pPr rtl="0"/>
-            <a:fld id="{F6217F63-A2E4-4C6D-9C5F-3A0056DF06E2}" type="datetime1">
+            <a:fld id="{29733511-ABD9-45FA-95F4-D5FB6BCA68B4}" type="datetime1">
               <a:rPr lang="de-DE" smtClean="0"/>
-              <a:t>22.01.19</a:t>
+              <a:t>22.01.2019</a:t>
             </a:fld>
             <a:endParaRPr lang="de-DE" dirty="0"/>
           </a:p>
@@ -14075,7 +14074,6 @@
   <p:clrMapOvr>
     <a:masterClrMapping/>
   </p:clrMapOvr>
-  <p:hf sldNum="0" hdr="0" ftr="0" dt="0"/>
 </p:sldLayout>
 </file>
 
@@ -14135,9 +14133,9 @@
           <a:lstStyle/>
           <a:p>
             <a:pPr rtl="0"/>
-            <a:fld id="{7E2AF863-D3B5-4A76-8706-AEB5B78FDCDC}" type="datetime1">
+            <a:fld id="{0D385308-F4A4-468E-880E-B164331E575F}" type="datetime1">
               <a:rPr lang="de-DE" smtClean="0"/>
-              <a:t>22.01.19</a:t>
+              <a:t>22.01.2019</a:t>
             </a:fld>
             <a:endParaRPr lang="de-DE" dirty="0"/>
           </a:p>
@@ -14245,9 +14243,9 @@
           <a:lstStyle/>
           <a:p>
             <a:pPr rtl="0"/>
-            <a:fld id="{97F73663-BF2F-4471-9530-8437E90AE323}" type="datetime1">
+            <a:fld id="{7F77B957-457C-454F-ADBD-D4B0545FAE9A}" type="datetime1">
               <a:rPr lang="de-DE" smtClean="0"/>
-              <a:t>22.01.19</a:t>
+              <a:t>22.01.2019</a:t>
             </a:fld>
             <a:endParaRPr lang="de-DE" dirty="0"/>
           </a:p>
@@ -14617,9 +14615,9 @@
           <a:lstStyle/>
           <a:p>
             <a:pPr rtl="0"/>
-            <a:fld id="{F6217F63-A2E4-4C6D-9C5F-3A0056DF06E2}" type="datetime1">
+            <a:fld id="{9936B011-39C7-4D24-BB87-8ACB942CED29}" type="datetime1">
               <a:rPr lang="de-DE" smtClean="0"/>
-              <a:t>22.01.19</a:t>
+              <a:t>22.01.2019</a:t>
             </a:fld>
             <a:endParaRPr lang="de-DE" dirty="0"/>
           </a:p>
@@ -14695,7 +14693,6 @@
   <p:clrMapOvr>
     <a:masterClrMapping/>
   </p:clrMapOvr>
-  <p:hf sldNum="0" hdr="0" ftr="0" dt="0"/>
 </p:sldLayout>
 </file>
 
@@ -14979,9 +14976,9 @@
           </a:lstStyle>
           <a:p>
             <a:pPr rtl="0"/>
-            <a:fld id="{F6217F63-A2E4-4C6D-9C5F-3A0056DF06E2}" type="datetime1">
+            <a:fld id="{BB61A0D9-F59B-45EF-8D3F-52A4F5683050}" type="datetime1">
               <a:rPr lang="de-DE" smtClean="0"/>
-              <a:t>22.01.19</a:t>
+              <a:t>22.01.2019</a:t>
             </a:fld>
             <a:endParaRPr lang="de-DE" dirty="0"/>
           </a:p>
@@ -15057,7 +15054,6 @@
   <p:clrMapOvr>
     <a:masterClrMapping/>
   </p:clrMapOvr>
-  <p:hf sldNum="0" hdr="0" ftr="0" dt="0"/>
 </p:sldLayout>
 </file>
 
@@ -15225,9 +15221,9 @@
           </a:lstStyle>
           <a:p>
             <a:pPr rtl="0"/>
-            <a:fld id="{F6217F63-A2E4-4C6D-9C5F-3A0056DF06E2}" type="datetime1">
+            <a:fld id="{A536592E-E6D1-41DC-AB6F-BECEF3358F10}" type="datetime1">
               <a:rPr lang="de-DE" smtClean="0"/>
-              <a:t>22.01.19</a:t>
+              <a:t>22.01.2019</a:t>
             </a:fld>
             <a:endParaRPr lang="de-DE" dirty="0"/>
           </a:p>
@@ -15353,7 +15349,7 @@
       </p:transition>
     </mc:Fallback>
   </mc:AlternateContent>
-  <p:hf sldNum="0" hdr="0" ftr="0" dt="0"/>
+  <p:hf hdr="0" ftr="0" dt="0"/>
   <p:txStyles>
     <p:titleStyle>
       <a:lvl1pPr algn="ctr" defTabSz="914400" rtl="0" eaLnBrk="1" latinLnBrk="0" hangingPunct="1">
@@ -15676,7 +15672,7 @@
       </a:lvl9pPr>
     </p:otherStyle>
   </p:txStyles>
-  <p:extLst>
+  <p:extLst mod="1">
     <p:ext uri="{27BBF7A9-308A-43DC-89C8-2F10F3537804}">
       <p15:sldGuideLst xmlns:p15="http://schemas.microsoft.com/office/powerpoint/2012/main">
         <p15:guide id="1" pos="3840" userDrawn="1">
@@ -15908,6 +15904,36 @@
               </a:rPr>
               <a:t> | Malte Johannsen | Marius Kock </a:t>
             </a:r>
+          </a:p>
+        </p:txBody>
+      </p:sp>
+      <p:sp>
+        <p:nvSpPr>
+          <p:cNvPr id="4" name="Foliennummernplatzhalter 3">
+            <a:extLst>
+              <a:ext uri="{FF2B5EF4-FFF2-40B4-BE49-F238E27FC236}">
+                <a16:creationId xmlns:a16="http://schemas.microsoft.com/office/drawing/2014/main" id="{448F89B3-FA04-4483-A6B8-47CBC74504A5}"/>
+              </a:ext>
+            </a:extLst>
+          </p:cNvPr>
+          <p:cNvSpPr>
+            <a:spLocks noGrp="1"/>
+          </p:cNvSpPr>
+          <p:nvPr>
+            <p:ph type="sldNum" sz="quarter" idx="12"/>
+          </p:nvPr>
+        </p:nvSpPr>
+        <p:spPr/>
+        <p:txBody>
+          <a:bodyPr/>
+          <a:lstStyle/>
+          <a:p>
+            <a:fld id="{8A7A6979-0714-4377-B894-6BE4C2D6E202}" type="slidenum">
+              <a:rPr lang="en-US" smtClean="0"/>
+              <a:pPr/>
+              <a:t>1</a:t>
+            </a:fld>
+            <a:endParaRPr lang="en-US" dirty="0"/>
           </a:p>
         </p:txBody>
       </p:sp>
@@ -16158,6 +16184,36 @@
           </a:graphicData>
         </a:graphic>
       </p:graphicFrame>
+      <p:sp>
+        <p:nvSpPr>
+          <p:cNvPr id="3" name="Foliennummernplatzhalter 2">
+            <a:extLst>
+              <a:ext uri="{FF2B5EF4-FFF2-40B4-BE49-F238E27FC236}">
+                <a16:creationId xmlns:a16="http://schemas.microsoft.com/office/drawing/2014/main" id="{CED3B0FD-5AB6-4D50-BD18-6E2B93530187}"/>
+              </a:ext>
+            </a:extLst>
+          </p:cNvPr>
+          <p:cNvSpPr>
+            <a:spLocks noGrp="1"/>
+          </p:cNvSpPr>
+          <p:nvPr>
+            <p:ph type="sldNum" sz="quarter" idx="12"/>
+          </p:nvPr>
+        </p:nvSpPr>
+        <p:spPr/>
+        <p:txBody>
+          <a:bodyPr/>
+          <a:lstStyle/>
+          <a:p>
+            <a:pPr rtl="0"/>
+            <a:fld id="{5F4C9F40-B079-4B71-A627-7266DFEA7F03}" type="slidenum">
+              <a:rPr lang="de-DE" smtClean="0"/>
+              <a:t>10</a:t>
+            </a:fld>
+            <a:endParaRPr lang="de-DE" dirty="0"/>
+          </a:p>
+        </p:txBody>
+      </p:sp>
     </p:spTree>
     <p:extLst>
       <p:ext uri="{BB962C8B-B14F-4D97-AF65-F5344CB8AC3E}">
@@ -16504,6 +16560,36 @@
           </a:p>
         </p:txBody>
       </p:sp>
+      <p:sp>
+        <p:nvSpPr>
+          <p:cNvPr id="4" name="Foliennummernplatzhalter 3">
+            <a:extLst>
+              <a:ext uri="{FF2B5EF4-FFF2-40B4-BE49-F238E27FC236}">
+                <a16:creationId xmlns:a16="http://schemas.microsoft.com/office/drawing/2014/main" id="{6940616C-733B-4EC5-92D9-DFA2822F83BD}"/>
+              </a:ext>
+            </a:extLst>
+          </p:cNvPr>
+          <p:cNvSpPr>
+            <a:spLocks noGrp="1"/>
+          </p:cNvSpPr>
+          <p:nvPr>
+            <p:ph type="sldNum" sz="quarter" idx="12"/>
+          </p:nvPr>
+        </p:nvSpPr>
+        <p:spPr/>
+        <p:txBody>
+          <a:bodyPr/>
+          <a:lstStyle/>
+          <a:p>
+            <a:pPr rtl="0"/>
+            <a:fld id="{5F4C9F40-B079-4B71-A627-7266DFEA7F03}" type="slidenum">
+              <a:rPr lang="de-DE" smtClean="0"/>
+              <a:t>2</a:t>
+            </a:fld>
+            <a:endParaRPr lang="de-DE" dirty="0"/>
+          </a:p>
+        </p:txBody>
+      </p:sp>
     </p:spTree>
     <p:extLst>
       <p:ext uri="{BB962C8B-B14F-4D97-AF65-F5344CB8AC3E}">
@@ -16613,6 +16699,36 @@
           </a:graphicData>
         </a:graphic>
       </p:graphicFrame>
+      <p:sp>
+        <p:nvSpPr>
+          <p:cNvPr id="3" name="Foliennummernplatzhalter 2">
+            <a:extLst>
+              <a:ext uri="{FF2B5EF4-FFF2-40B4-BE49-F238E27FC236}">
+                <a16:creationId xmlns:a16="http://schemas.microsoft.com/office/drawing/2014/main" id="{6153EE57-B584-4BB6-AA62-693A7322E754}"/>
+              </a:ext>
+            </a:extLst>
+          </p:cNvPr>
+          <p:cNvSpPr>
+            <a:spLocks noGrp="1"/>
+          </p:cNvSpPr>
+          <p:nvPr>
+            <p:ph type="sldNum" sz="quarter" idx="12"/>
+          </p:nvPr>
+        </p:nvSpPr>
+        <p:spPr/>
+        <p:txBody>
+          <a:bodyPr/>
+          <a:lstStyle/>
+          <a:p>
+            <a:pPr rtl="0"/>
+            <a:fld id="{5F4C9F40-B079-4B71-A627-7266DFEA7F03}" type="slidenum">
+              <a:rPr lang="de-DE" smtClean="0"/>
+              <a:t>3</a:t>
+            </a:fld>
+            <a:endParaRPr lang="de-DE" dirty="0"/>
+          </a:p>
+        </p:txBody>
+      </p:sp>
     </p:spTree>
     <p:extLst>
       <p:ext uri="{BB962C8B-B14F-4D97-AF65-F5344CB8AC3E}">
@@ -17817,6 +17933,9 @@
             <a:avLst/>
           </a:prstGeom>
           <a:ln>
+            <a:solidFill>
+              <a:srgbClr val="FF0000"/>
+            </a:solidFill>
             <a:tailEnd type="triangle"/>
           </a:ln>
         </p:spPr>
@@ -17860,18 +17979,21 @@
             <a:avLst/>
           </a:prstGeom>
           <a:ln>
+            <a:solidFill>
+              <a:srgbClr val="00B050"/>
+            </a:solidFill>
             <a:tailEnd type="triangle"/>
           </a:ln>
         </p:spPr>
         <p:style>
           <a:lnRef idx="3">
-            <a:schemeClr val="accent4"/>
+            <a:schemeClr val="accent3"/>
           </a:lnRef>
           <a:fillRef idx="0">
-            <a:schemeClr val="accent4"/>
+            <a:schemeClr val="accent3"/>
           </a:fillRef>
           <a:effectRef idx="2">
-            <a:schemeClr val="accent4"/>
+            <a:schemeClr val="accent3"/>
           </a:effectRef>
           <a:fontRef idx="minor">
             <a:schemeClr val="tx1"/>
@@ -17987,18 +18109,21 @@
             <a:avLst/>
           </a:prstGeom>
           <a:ln>
+            <a:solidFill>
+              <a:srgbClr val="00B050"/>
+            </a:solidFill>
             <a:tailEnd type="triangle"/>
           </a:ln>
         </p:spPr>
         <p:style>
           <a:lnRef idx="3">
-            <a:schemeClr val="accent4"/>
+            <a:schemeClr val="accent3"/>
           </a:lnRef>
           <a:fillRef idx="0">
-            <a:schemeClr val="accent4"/>
+            <a:schemeClr val="accent3"/>
           </a:fillRef>
           <a:effectRef idx="2">
-            <a:schemeClr val="accent4"/>
+            <a:schemeClr val="accent3"/>
           </a:effectRef>
           <a:fontRef idx="minor">
             <a:schemeClr val="tx1"/>
@@ -18030,6 +18155,9 @@
             <a:avLst/>
           </a:prstGeom>
           <a:ln>
+            <a:solidFill>
+              <a:srgbClr val="FF0000"/>
+            </a:solidFill>
             <a:tailEnd type="triangle"/>
           </a:ln>
         </p:spPr>
@@ -18048,6 +18176,36 @@
           </a:fontRef>
         </p:style>
       </p:cxnSp>
+      <p:sp>
+        <p:nvSpPr>
+          <p:cNvPr id="8" name="Foliennummernplatzhalter 7">
+            <a:extLst>
+              <a:ext uri="{FF2B5EF4-FFF2-40B4-BE49-F238E27FC236}">
+                <a16:creationId xmlns:a16="http://schemas.microsoft.com/office/drawing/2014/main" id="{677D64C0-8A0F-410E-89BA-FA6C9816601C}"/>
+              </a:ext>
+            </a:extLst>
+          </p:cNvPr>
+          <p:cNvSpPr>
+            <a:spLocks noGrp="1"/>
+          </p:cNvSpPr>
+          <p:nvPr>
+            <p:ph type="sldNum" sz="quarter" idx="12"/>
+          </p:nvPr>
+        </p:nvSpPr>
+        <p:spPr/>
+        <p:txBody>
+          <a:bodyPr/>
+          <a:lstStyle/>
+          <a:p>
+            <a:pPr rtl="0"/>
+            <a:fld id="{5F4C9F40-B079-4B71-A627-7266DFEA7F03}" type="slidenum">
+              <a:rPr lang="de-DE" smtClean="0"/>
+              <a:t>4</a:t>
+            </a:fld>
+            <a:endParaRPr lang="de-DE" dirty="0"/>
+          </a:p>
+        </p:txBody>
+      </p:sp>
     </p:spTree>
     <p:extLst>
       <p:ext uri="{BB962C8B-B14F-4D97-AF65-F5344CB8AC3E}">
@@ -18360,6 +18518,36 @@
           </a:prstGeom>
         </p:spPr>
       </p:pic>
+      <p:sp>
+        <p:nvSpPr>
+          <p:cNvPr id="4" name="Foliennummernplatzhalter 3">
+            <a:extLst>
+              <a:ext uri="{FF2B5EF4-FFF2-40B4-BE49-F238E27FC236}">
+                <a16:creationId xmlns:a16="http://schemas.microsoft.com/office/drawing/2014/main" id="{408A66FA-0C9C-471E-A680-3581827D2B97}"/>
+              </a:ext>
+            </a:extLst>
+          </p:cNvPr>
+          <p:cNvSpPr>
+            <a:spLocks noGrp="1"/>
+          </p:cNvSpPr>
+          <p:nvPr>
+            <p:ph type="sldNum" sz="quarter" idx="12"/>
+          </p:nvPr>
+        </p:nvSpPr>
+        <p:spPr/>
+        <p:txBody>
+          <a:bodyPr/>
+          <a:lstStyle/>
+          <a:p>
+            <a:pPr rtl="0"/>
+            <a:fld id="{5F4C9F40-B079-4B71-A627-7266DFEA7F03}" type="slidenum">
+              <a:rPr lang="de-DE" smtClean="0"/>
+              <a:t>5</a:t>
+            </a:fld>
+            <a:endParaRPr lang="de-DE" dirty="0"/>
+          </a:p>
+        </p:txBody>
+      </p:sp>
     </p:spTree>
     <p:extLst>
       <p:ext uri="{BB962C8B-B14F-4D97-AF65-F5344CB8AC3E}">
@@ -19575,6 +19763,9 @@
             <a:avLst/>
           </a:prstGeom>
           <a:ln>
+            <a:solidFill>
+              <a:srgbClr val="FF0000"/>
+            </a:solidFill>
             <a:tailEnd type="triangle"/>
           </a:ln>
         </p:spPr>
@@ -19618,6 +19809,9 @@
             <a:avLst/>
           </a:prstGeom>
           <a:ln>
+            <a:solidFill>
+              <a:srgbClr val="00B050"/>
+            </a:solidFill>
             <a:tailEnd type="triangle"/>
           </a:ln>
         </p:spPr>
@@ -19744,6 +19938,9 @@
             <a:avLst/>
           </a:prstGeom>
           <a:ln>
+            <a:solidFill>
+              <a:srgbClr val="00B050"/>
+            </a:solidFill>
             <a:tailEnd type="triangle"/>
           </a:ln>
         </p:spPr>
@@ -19787,6 +19984,9 @@
             <a:avLst/>
           </a:prstGeom>
           <a:ln>
+            <a:solidFill>
+              <a:srgbClr val="FF0000"/>
+            </a:solidFill>
             <a:tailEnd type="triangle"/>
           </a:ln>
         </p:spPr>
@@ -19837,9 +20037,7 @@
             <a:r>
               <a:rPr lang="de-DE" dirty="0">
                 <a:solidFill>
-                  <a:schemeClr val="accent4">
-                    <a:lumMod val="75000"/>
-                  </a:schemeClr>
+                  <a:srgbClr val="00B050"/>
                 </a:solidFill>
               </a:rPr>
               <a:t>Shuffle</a:t>
@@ -19850,13 +20048,41 @@
             <a:r>
               <a:rPr lang="de-DE" dirty="0">
                 <a:solidFill>
-                  <a:schemeClr val="accent4">
-                    <a:lumMod val="75000"/>
-                  </a:schemeClr>
+                  <a:srgbClr val="00B050"/>
                 </a:solidFill>
               </a:rPr>
               <a:t>Sitzreinfolge</a:t>
             </a:r>
+          </a:p>
+        </p:txBody>
+      </p:sp>
+      <p:sp>
+        <p:nvSpPr>
+          <p:cNvPr id="8" name="Foliennummernplatzhalter 7">
+            <a:extLst>
+              <a:ext uri="{FF2B5EF4-FFF2-40B4-BE49-F238E27FC236}">
+                <a16:creationId xmlns:a16="http://schemas.microsoft.com/office/drawing/2014/main" id="{F1B1AAC6-D18A-4F94-8D71-8606F978CAC7}"/>
+              </a:ext>
+            </a:extLst>
+          </p:cNvPr>
+          <p:cNvSpPr>
+            <a:spLocks noGrp="1"/>
+          </p:cNvSpPr>
+          <p:nvPr>
+            <p:ph type="sldNum" sz="quarter" idx="12"/>
+          </p:nvPr>
+        </p:nvSpPr>
+        <p:spPr/>
+        <p:txBody>
+          <a:bodyPr/>
+          <a:lstStyle/>
+          <a:p>
+            <a:pPr rtl="0"/>
+            <a:fld id="{5F4C9F40-B079-4B71-A627-7266DFEA7F03}" type="slidenum">
+              <a:rPr lang="de-DE" smtClean="0"/>
+              <a:t>6</a:t>
+            </a:fld>
+            <a:endParaRPr lang="de-DE" dirty="0"/>
           </a:p>
         </p:txBody>
       </p:sp>
@@ -19978,6 +20204,36 @@
           </a:graphicData>
         </a:graphic>
       </p:graphicFrame>
+      <p:sp>
+        <p:nvSpPr>
+          <p:cNvPr id="3" name="Foliennummernplatzhalter 2">
+            <a:extLst>
+              <a:ext uri="{FF2B5EF4-FFF2-40B4-BE49-F238E27FC236}">
+                <a16:creationId xmlns:a16="http://schemas.microsoft.com/office/drawing/2014/main" id="{17693ED7-296E-463D-A579-1D2A3B2C50E7}"/>
+              </a:ext>
+            </a:extLst>
+          </p:cNvPr>
+          <p:cNvSpPr>
+            <a:spLocks noGrp="1"/>
+          </p:cNvSpPr>
+          <p:nvPr>
+            <p:ph type="sldNum" sz="quarter" idx="12"/>
+          </p:nvPr>
+        </p:nvSpPr>
+        <p:spPr/>
+        <p:txBody>
+          <a:bodyPr/>
+          <a:lstStyle/>
+          <a:p>
+            <a:pPr rtl="0"/>
+            <a:fld id="{5F4C9F40-B079-4B71-A627-7266DFEA7F03}" type="slidenum">
+              <a:rPr lang="de-DE" smtClean="0"/>
+              <a:t>7</a:t>
+            </a:fld>
+            <a:endParaRPr lang="de-DE" dirty="0"/>
+          </a:p>
+        </p:txBody>
+      </p:sp>
     </p:spTree>
     <p:extLst>
       <p:ext uri="{BB962C8B-B14F-4D97-AF65-F5344CB8AC3E}">
@@ -22049,6 +22305,36 @@
           </a:p>
         </p:txBody>
       </p:sp>
+      <p:sp>
+        <p:nvSpPr>
+          <p:cNvPr id="3" name="Foliennummernplatzhalter 2">
+            <a:extLst>
+              <a:ext uri="{FF2B5EF4-FFF2-40B4-BE49-F238E27FC236}">
+                <a16:creationId xmlns:a16="http://schemas.microsoft.com/office/drawing/2014/main" id="{3F620E9E-70DC-47D7-AF88-93F70885B4F4}"/>
+              </a:ext>
+            </a:extLst>
+          </p:cNvPr>
+          <p:cNvSpPr>
+            <a:spLocks noGrp="1"/>
+          </p:cNvSpPr>
+          <p:nvPr>
+            <p:ph type="sldNum" sz="quarter" idx="12"/>
+          </p:nvPr>
+        </p:nvSpPr>
+        <p:spPr/>
+        <p:txBody>
+          <a:bodyPr/>
+          <a:lstStyle/>
+          <a:p>
+            <a:pPr rtl="0"/>
+            <a:fld id="{5F4C9F40-B079-4B71-A627-7266DFEA7F03}" type="slidenum">
+              <a:rPr lang="de-DE" smtClean="0"/>
+              <a:t>8</a:t>
+            </a:fld>
+            <a:endParaRPr lang="de-DE" dirty="0"/>
+          </a:p>
+        </p:txBody>
+      </p:sp>
     </p:spTree>
     <p:extLst>
       <p:ext uri="{BB962C8B-B14F-4D97-AF65-F5344CB8AC3E}">
@@ -23533,6 +23819,36 @@
           </a:graphicData>
         </a:graphic>
       </p:graphicFrame>
+      <p:sp>
+        <p:nvSpPr>
+          <p:cNvPr id="3" name="Foliennummernplatzhalter 2">
+            <a:extLst>
+              <a:ext uri="{FF2B5EF4-FFF2-40B4-BE49-F238E27FC236}">
+                <a16:creationId xmlns:a16="http://schemas.microsoft.com/office/drawing/2014/main" id="{879226B8-CBA9-4C23-B262-4CA9140C8BE4}"/>
+              </a:ext>
+            </a:extLst>
+          </p:cNvPr>
+          <p:cNvSpPr>
+            <a:spLocks noGrp="1"/>
+          </p:cNvSpPr>
+          <p:nvPr>
+            <p:ph type="sldNum" sz="quarter" idx="12"/>
+          </p:nvPr>
+        </p:nvSpPr>
+        <p:spPr/>
+        <p:txBody>
+          <a:bodyPr/>
+          <a:lstStyle/>
+          <a:p>
+            <a:pPr rtl="0"/>
+            <a:fld id="{5F4C9F40-B079-4B71-A627-7266DFEA7F03}" type="slidenum">
+              <a:rPr lang="de-DE" smtClean="0"/>
+              <a:t>9</a:t>
+            </a:fld>
+            <a:endParaRPr lang="de-DE" dirty="0"/>
+          </a:p>
+        </p:txBody>
+      </p:sp>
     </p:spTree>
     <p:extLst>
       <p:ext uri="{BB962C8B-B14F-4D97-AF65-F5344CB8AC3E}">

</xml_diff>